<commit_message>
6-th lecture is fixed
</commit_message>
<xml_diff>
--- a/6. Drawing-with-Loops/6. Drawing-with-Loops.pptx
+++ b/6. Drawing-with-Loops/6. Drawing-with-Loops.pptx
@@ -137,7 +137,7 @@
   </p:defaultTextStyle>
   <p:extLst>
     <p:ext uri="{EFAFB233-063F-42B5-8137-9DF3F51BA10A}">
-      <p15:sldGuideLst xmlns:p15="http://schemas.microsoft.com/office/powerpoint/2012/main">
+      <p15:sldGuideLst xmlns:p15="http://schemas.microsoft.com/office/powerpoint/2012/main" xmlns="">
         <p15:guide id="1" orient="horz" pos="2160" userDrawn="1">
           <p15:clr>
             <a:srgbClr val="A4A3A4"/>
@@ -151,7 +151,7 @@
       </p15:sldGuideLst>
     </p:ext>
     <p:ext uri="{2D200454-40CA-4A62-9FC3-DE9A4176ACB9}">
-      <p15:notesGuideLst xmlns:p15="http://schemas.microsoft.com/office/powerpoint/2012/main">
+      <p15:notesGuideLst xmlns:p15="http://schemas.microsoft.com/office/powerpoint/2012/main" xmlns="">
         <p15:guide id="1" orient="horz" pos="2880">
           <p15:clr>
             <a:srgbClr val="A4A3A4"/>
@@ -251,7 +251,7 @@
             <a:fld id="{FE5B4EDC-59C0-49C7-8ADA-5A781B329E02}" type="datetimeFigureOut">
               <a:rPr lang="en-US"/>
               <a:pPr/>
-              <a:t>3/27/2017</a:t>
+              <a:t>5/17/2017</a:t>
             </a:fld>
             <a:endParaRPr dirty="0"/>
           </a:p>
@@ -450,7 +450,7 @@
             <a:fld id="{F2D8D46A-B586-417D-BFBD-8C8FE0AAF762}" type="datetimeFigureOut">
               <a:rPr lang="en-US" smtClean="0"/>
               <a:pPr/>
-              <a:t>3/27/2017</a:t>
+              <a:t>5/17/2017</a:t>
             </a:fld>
             <a:endParaRPr lang="en-US"/>
           </a:p>
@@ -2718,7 +2718,7 @@
             <a:fld id="{055373AC-9AA7-423B-BA00-BA1C74164DBD}" type="datetime1">
               <a:rPr lang="en-US" smtClean="0"/>
               <a:pPr/>
-              <a:t>3/27/2017</a:t>
+              <a:t>5/17/2017</a:t>
             </a:fld>
             <a:endParaRPr lang="en-US" dirty="0"/>
           </a:p>
@@ -3886,7 +3886,7 @@
             <a:fld id="{055373AC-9AA7-423B-BA00-BA1C74164DBD}" type="datetime1">
               <a:rPr lang="en-US" smtClean="0"/>
               <a:pPr/>
-              <a:t>3/27/2017</a:t>
+              <a:t>5/17/2017</a:t>
             </a:fld>
             <a:endParaRPr lang="en-US" dirty="0"/>
           </a:p>
@@ -4415,7 +4415,7 @@
   </p:txStyles>
   <p:extLst mod="1">
     <p:ext uri="{27BBF7A9-308A-43DC-89C8-2F10F3537804}">
-      <p15:sldGuideLst xmlns:p15="http://schemas.microsoft.com/office/powerpoint/2012/main">
+      <p15:sldGuideLst xmlns:p15="http://schemas.microsoft.com/office/powerpoint/2012/main" xmlns="">
         <p15:guide id="1" orient="horz" pos="2160" userDrawn="1">
           <p15:clr>
             <a:srgbClr val="F26B43"/>
@@ -5797,19 +5797,17 @@
               <a:rPr lang="en-US" dirty="0">
                 <a:hlinkClick r:id="rId2"/>
               </a:rPr>
-              <a:t>https://judge.softuni.bg/Contests/Practice/Index/15</a:t>
-            </a:r>
-            <a:r>
-              <a:rPr lang="bg-BG" dirty="0">
+              <a:t>https://</a:t>
+            </a:r>
+            <a:r>
+              <a:rPr lang="en-US" dirty="0" smtClean="0">
                 <a:hlinkClick r:id="rId2"/>
               </a:rPr>
-              <a:t>5</a:t>
-            </a:r>
-            <a:r>
-              <a:rPr lang="en-US" dirty="0">
-                <a:hlinkClick r:id="rId2"/>
-              </a:rPr>
-              <a:t>#5</a:t>
+              <a:t>judge.softuni.bg/Contests/Practice/Index/533#7</a:t>
+            </a:r>
+            <a:r>
+              <a:rPr lang="en-US" dirty="0" smtClean="0"/>
+              <a:t> </a:t>
             </a:r>
             <a:endParaRPr lang="en-US" dirty="0"/>
           </a:p>
@@ -7116,7 +7114,17 @@
               <a:rPr lang="en-US" sz="2600" dirty="0">
                 <a:hlinkClick r:id="rId3"/>
               </a:rPr>
-              <a:t>https://judge.softuni.bg/Contests/Practice/Index/155#6</a:t>
+              <a:t>https://</a:t>
+            </a:r>
+            <a:r>
+              <a:rPr lang="en-US" sz="2600" dirty="0" smtClean="0">
+                <a:hlinkClick r:id="rId3"/>
+              </a:rPr>
+              <a:t>judge.softuni.bg/Contests/Practice/Index/533#3</a:t>
+            </a:r>
+            <a:r>
+              <a:rPr lang="en-US" sz="2600" dirty="0" smtClean="0"/>
+              <a:t> </a:t>
             </a:r>
             <a:endParaRPr lang="en-US" sz="2600" dirty="0"/>
           </a:p>
@@ -9470,7 +9478,17 @@
               <a:rPr lang="en-US" sz="2600" dirty="0">
                 <a:hlinkClick r:id="rId3"/>
               </a:rPr>
-              <a:t>https://judge.softuni.bg/Contests/Practice/Index/155#7</a:t>
+              <a:t>https://</a:t>
+            </a:r>
+            <a:r>
+              <a:rPr lang="en-US" sz="2600" dirty="0" smtClean="0">
+                <a:hlinkClick r:id="rId3"/>
+              </a:rPr>
+              <a:t>judge.softuni.bg/Contests/Practice/Index/533#8</a:t>
+            </a:r>
+            <a:r>
+              <a:rPr lang="en-US" sz="2600" dirty="0" smtClean="0"/>
+              <a:t> </a:t>
             </a:r>
             <a:endParaRPr lang="en-US" sz="2600" dirty="0"/>
           </a:p>
@@ -12353,7 +12371,17 @@
               <a:rPr lang="en-US" sz="2600" dirty="0">
                 <a:hlinkClick r:id="rId3"/>
               </a:rPr>
-              <a:t>https://judge.softuni.bg/Contests/Practice/Index/155#8</a:t>
+              <a:t>https://</a:t>
+            </a:r>
+            <a:r>
+              <a:rPr lang="en-US" sz="2600" dirty="0" smtClean="0">
+                <a:hlinkClick r:id="rId3"/>
+              </a:rPr>
+              <a:t>judge.softuni.bg/Contests/Practice/Index/533#4</a:t>
+            </a:r>
+            <a:r>
+              <a:rPr lang="en-US" sz="2600" dirty="0" smtClean="0"/>
+              <a:t> </a:t>
             </a:r>
             <a:endParaRPr lang="en-US" sz="2600" dirty="0"/>
           </a:p>
@@ -15014,7 +15042,7 @@
         <p:spPr>
           <a:xfrm>
             <a:off x="593724" y="5967140"/>
-            <a:ext cx="10983904" cy="492443"/>
+            <a:ext cx="11152220" cy="492443"/>
           </a:xfrm>
           <a:prstGeom prst="rect">
             <a:avLst/>
@@ -15043,7 +15071,17 @@
               <a:rPr lang="en-US" sz="2600" dirty="0">
                 <a:hlinkClick r:id="rId3"/>
               </a:rPr>
-              <a:t>https://judge.softuni.bg/Contests/Practice/Index/155#9</a:t>
+              <a:t>https://</a:t>
+            </a:r>
+            <a:r>
+              <a:rPr lang="en-US" sz="2600" dirty="0" smtClean="0">
+                <a:hlinkClick r:id="rId3"/>
+              </a:rPr>
+              <a:t>judge.softuni.bg/Contests/Practice/Index/533#0</a:t>
+            </a:r>
+            <a:r>
+              <a:rPr lang="en-US" sz="2600" dirty="0" smtClean="0"/>
+              <a:t> </a:t>
             </a:r>
             <a:endParaRPr lang="en-US" sz="2600" dirty="0"/>
           </a:p>
@@ -21372,19 +21410,29 @@
               <a:rPr lang="en-US" dirty="0">
                 <a:hlinkClick r:id="rId2"/>
               </a:rPr>
-              <a:t>https://judge.softuni.bg/Contests/Practice/Index/15</a:t>
-            </a:r>
-            <a:r>
-              <a:rPr lang="bg-BG" dirty="0">
+              <a:t>https://</a:t>
+            </a:r>
+            <a:r>
+              <a:rPr lang="en-US" dirty="0" smtClean="0">
                 <a:hlinkClick r:id="rId2"/>
               </a:rPr>
-              <a:t>5</a:t>
-            </a:r>
-            <a:r>
-              <a:rPr lang="en-US" dirty="0">
+              <a:t>judge.softuni.bg/Contests/Practice/Index/5</a:t>
+            </a:r>
+            <a:r>
+              <a:rPr lang="en-US" dirty="0" smtClean="0">
                 <a:hlinkClick r:id="rId2"/>
               </a:rPr>
-              <a:t>#0</a:t>
+              <a:t>33</a:t>
+            </a:r>
+            <a:r>
+              <a:rPr lang="en-US" dirty="0" smtClean="0">
+                <a:hlinkClick r:id="rId2"/>
+              </a:rPr>
+              <a:t>#5</a:t>
+            </a:r>
+            <a:r>
+              <a:rPr lang="en-US" dirty="0" smtClean="0"/>
+              <a:t> </a:t>
             </a:r>
             <a:endParaRPr lang="en-US" dirty="0"/>
           </a:p>
@@ -22039,19 +22087,29 @@
               <a:rPr lang="en-US" dirty="0">
                 <a:hlinkClick r:id="rId2"/>
               </a:rPr>
-              <a:t>https://judge.softuni.bg/Contests/Practice/Index/15</a:t>
-            </a:r>
-            <a:r>
-              <a:rPr lang="bg-BG" dirty="0">
+              <a:t>https://</a:t>
+            </a:r>
+            <a:r>
+              <a:rPr lang="en-US" dirty="0" smtClean="0">
                 <a:hlinkClick r:id="rId2"/>
               </a:rPr>
-              <a:t>5</a:t>
-            </a:r>
-            <a:r>
-              <a:rPr lang="en-US" dirty="0">
+              <a:t>judge.softuni.bg/Contests/Practice/Index/5</a:t>
+            </a:r>
+            <a:r>
+              <a:rPr lang="en-US" dirty="0" smtClean="0">
                 <a:hlinkClick r:id="rId2"/>
               </a:rPr>
-              <a:t>#1</a:t>
+              <a:t>33</a:t>
+            </a:r>
+            <a:r>
+              <a:rPr lang="en-US" dirty="0" smtClean="0">
+                <a:hlinkClick r:id="rId2"/>
+              </a:rPr>
+              <a:t>#6</a:t>
+            </a:r>
+            <a:r>
+              <a:rPr lang="en-US" dirty="0" smtClean="0"/>
+              <a:t> </a:t>
             </a:r>
             <a:endParaRPr lang="en-US" dirty="0"/>
           </a:p>
@@ -24089,19 +24147,17 @@
               <a:rPr lang="en-US" dirty="0">
                 <a:hlinkClick r:id="rId2"/>
               </a:rPr>
-              <a:t>https://judge.softuni.bg/Contests/Practice/Index/15</a:t>
-            </a:r>
-            <a:r>
-              <a:rPr lang="bg-BG" dirty="0">
+              <a:t>https://</a:t>
+            </a:r>
+            <a:r>
+              <a:rPr lang="en-US" dirty="0" smtClean="0">
                 <a:hlinkClick r:id="rId2"/>
               </a:rPr>
-              <a:t>5</a:t>
-            </a:r>
-            <a:r>
-              <a:rPr lang="en-US" dirty="0">
-                <a:hlinkClick r:id="rId2"/>
-              </a:rPr>
-              <a:t>#2</a:t>
+              <a:t>judge.softuni.bg/Contests/Practice/Index/533#1</a:t>
+            </a:r>
+            <a:r>
+              <a:rPr lang="en-US" dirty="0" smtClean="0"/>
+              <a:t> </a:t>
             </a:r>
             <a:endParaRPr lang="en-US" dirty="0"/>
           </a:p>
@@ -25220,19 +25276,17 @@
               <a:rPr lang="en-US" dirty="0">
                 <a:hlinkClick r:id="rId2"/>
               </a:rPr>
-              <a:t>https://judge.softuni.bg/Contests/Practice/Index/15</a:t>
-            </a:r>
-            <a:r>
-              <a:rPr lang="bg-BG" dirty="0">
+              <a:t>https://</a:t>
+            </a:r>
+            <a:r>
+              <a:rPr lang="en-US" dirty="0" smtClean="0">
                 <a:hlinkClick r:id="rId2"/>
               </a:rPr>
-              <a:t>5</a:t>
-            </a:r>
-            <a:r>
-              <a:rPr lang="en-US" dirty="0">
-                <a:hlinkClick r:id="rId2"/>
-              </a:rPr>
-              <a:t>#3</a:t>
+              <a:t>judge.softuni.bg/Contests/Practice/Index/533#9</a:t>
+            </a:r>
+            <a:r>
+              <a:rPr lang="en-US" dirty="0" smtClean="0"/>
+              <a:t> </a:t>
             </a:r>
             <a:endParaRPr lang="en-US" dirty="0"/>
           </a:p>
@@ -26146,19 +26200,17 @@
               <a:rPr lang="en-US" dirty="0">
                 <a:hlinkClick r:id="rId2"/>
               </a:rPr>
-              <a:t>https://judge.softuni.bg/Contests/Practice/Index/15</a:t>
-            </a:r>
-            <a:r>
-              <a:rPr lang="bg-BG" dirty="0">
+              <a:t>https://</a:t>
+            </a:r>
+            <a:r>
+              <a:rPr lang="en-US" dirty="0" smtClean="0">
                 <a:hlinkClick r:id="rId2"/>
               </a:rPr>
-              <a:t>5</a:t>
-            </a:r>
-            <a:r>
-              <a:rPr lang="en-US" dirty="0">
-                <a:hlinkClick r:id="rId2"/>
-              </a:rPr>
-              <a:t>#4</a:t>
+              <a:t>judge.softuni.bg/Contests/Practice/Index/533#2</a:t>
+            </a:r>
+            <a:r>
+              <a:rPr lang="en-US" dirty="0" smtClean="0"/>
+              <a:t> </a:t>
             </a:r>
             <a:endParaRPr lang="en-US" dirty="0"/>
           </a:p>

</xml_diff>